<commit_message>
Updates to pptx around references and twitter
</commit_message>
<xml_diff>
--- a/ErrorHandling.pptx
+++ b/ErrorHandling.pptx
@@ -16,8 +16,8 @@
     <p:sldId id="264" r:id="rId7"/>
     <p:sldId id="265" r:id="rId8"/>
     <p:sldId id="263" r:id="rId9"/>
-    <p:sldId id="256" r:id="rId10"/>
-    <p:sldId id="261" r:id="rId11"/>
+    <p:sldId id="261" r:id="rId10"/>
+    <p:sldId id="266" r:id="rId11"/>
   </p:sldIdLst>
   <p:sldSz cx="12192000" cy="6858000"/>
   <p:notesSz cx="6858000" cy="9144000"/>
@@ -206,7 +206,7 @@
           <a:p>
             <a:fld id="{37CF74D0-7F99-48D3-AC5B-1865453BEEA5}" type="datetimeFigureOut">
               <a:rPr lang="en-US" smtClean="0"/>
-              <a:t>1/7/2019</a:t>
+              <a:t>9/17/2019</a:t>
             </a:fld>
             <a:endParaRPr lang="en-US"/>
           </a:p>
@@ -904,6 +904,15 @@
               <a:t>Large try blocks are not good. Assume you have a file that you are writing out to and you need as many lines to be written to paint a picture. If you have a large try block you may be loosing out on information because an unrelated process errors out.</a:t>
             </a:r>
           </a:p>
+          <a:p>
+            <a:endParaRPr lang="en-US" dirty="0"/>
+          </a:p>
+          <a:p>
+            <a:r>
+              <a:rPr lang="en-US" dirty="0"/>
+              <a:t>Show example 2</a:t>
+            </a:r>
+          </a:p>
         </p:txBody>
       </p:sp>
       <p:sp>
@@ -1015,7 +1024,7 @@
           <a:p>
             <a:r>
               <a:rPr lang="en-US" dirty="0"/>
-              <a:t>Show example 2</a:t>
+              <a:t>Show example 3</a:t>
             </a:r>
           </a:p>
         </p:txBody>
@@ -1120,7 +1129,7 @@
           <a:p>
             <a:r>
               <a:rPr lang="en-US" dirty="0"/>
-              <a:t>Show example 3</a:t>
+              <a:t>Show example 4</a:t>
             </a:r>
           </a:p>
         </p:txBody>
@@ -1241,7 +1250,7 @@
           <a:p>
             <a:r>
               <a:rPr lang="en-US" dirty="0"/>
-              <a:t>Show example 4</a:t>
+              <a:t>Show example 5</a:t>
             </a:r>
           </a:p>
         </p:txBody>
@@ -1376,13 +1385,8 @@
           <a:p>
             <a:r>
               <a:rPr lang="en-US" dirty="0"/>
-              <a:t>Show </a:t>
-            </a:r>
-            <a:r>
-              <a:rPr lang="en-US"/>
-              <a:t>example 5 then 6</a:t>
-            </a:r>
-            <a:endParaRPr lang="en-US" dirty="0"/>
+              <a:t>Show example 6 then 7</a:t>
+            </a:r>
           </a:p>
         </p:txBody>
       </p:sp>
@@ -2144,7 +2148,7 @@
           <a:p>
             <a:fld id="{995B0E5A-BAC0-4D23-A7B5-3C7BF77F7E5A}" type="datetimeFigureOut">
               <a:rPr lang="en-US" smtClean="0"/>
-              <a:t>1/7/2019</a:t>
+              <a:t>9/17/2019</a:t>
             </a:fld>
             <a:endParaRPr lang="en-US"/>
           </a:p>
@@ -2395,7 +2399,7 @@
           <a:p>
             <a:fld id="{995B0E5A-BAC0-4D23-A7B5-3C7BF77F7E5A}" type="datetimeFigureOut">
               <a:rPr lang="en-US" smtClean="0"/>
-              <a:t>1/7/2019</a:t>
+              <a:t>9/17/2019</a:t>
             </a:fld>
             <a:endParaRPr lang="en-US"/>
           </a:p>
@@ -2709,7 +2713,7 @@
           <a:p>
             <a:fld id="{995B0E5A-BAC0-4D23-A7B5-3C7BF77F7E5A}" type="datetimeFigureOut">
               <a:rPr lang="en-US" smtClean="0"/>
-              <a:t>1/7/2019</a:t>
+              <a:t>9/17/2019</a:t>
             </a:fld>
             <a:endParaRPr lang="en-US"/>
           </a:p>
@@ -3050,7 +3054,7 @@
           <a:p>
             <a:fld id="{995B0E5A-BAC0-4D23-A7B5-3C7BF77F7E5A}" type="datetimeFigureOut">
               <a:rPr lang="en-US" smtClean="0"/>
-              <a:t>1/7/2019</a:t>
+              <a:t>9/17/2019</a:t>
             </a:fld>
             <a:endParaRPr lang="en-US"/>
           </a:p>
@@ -3364,7 +3368,7 @@
           <a:p>
             <a:fld id="{995B0E5A-BAC0-4D23-A7B5-3C7BF77F7E5A}" type="datetimeFigureOut">
               <a:rPr lang="en-US" smtClean="0"/>
-              <a:t>1/7/2019</a:t>
+              <a:t>9/17/2019</a:t>
             </a:fld>
             <a:endParaRPr lang="en-US"/>
           </a:p>
@@ -3757,7 +3761,7 @@
           <a:p>
             <a:fld id="{995B0E5A-BAC0-4D23-A7B5-3C7BF77F7E5A}" type="datetimeFigureOut">
               <a:rPr lang="en-US" smtClean="0"/>
-              <a:t>1/7/2019</a:t>
+              <a:t>9/17/2019</a:t>
             </a:fld>
             <a:endParaRPr lang="en-US"/>
           </a:p>
@@ -3927,7 +3931,7 @@
           <a:p>
             <a:fld id="{995B0E5A-BAC0-4D23-A7B5-3C7BF77F7E5A}" type="datetimeFigureOut">
               <a:rPr lang="en-US" smtClean="0"/>
-              <a:t>1/7/2019</a:t>
+              <a:t>9/17/2019</a:t>
             </a:fld>
             <a:endParaRPr lang="en-US"/>
           </a:p>
@@ -4107,7 +4111,7 @@
           <a:p>
             <a:fld id="{995B0E5A-BAC0-4D23-A7B5-3C7BF77F7E5A}" type="datetimeFigureOut">
               <a:rPr lang="en-US" smtClean="0"/>
-              <a:t>1/7/2019</a:t>
+              <a:t>9/17/2019</a:t>
             </a:fld>
             <a:endParaRPr lang="en-US"/>
           </a:p>
@@ -4283,7 +4287,7 @@
           <a:p>
             <a:fld id="{995B0E5A-BAC0-4D23-A7B5-3C7BF77F7E5A}" type="datetimeFigureOut">
               <a:rPr lang="en-US" smtClean="0"/>
-              <a:t>1/7/2019</a:t>
+              <a:t>9/17/2019</a:t>
             </a:fld>
             <a:endParaRPr lang="en-US"/>
           </a:p>
@@ -4530,7 +4534,7 @@
           <a:p>
             <a:fld id="{995B0E5A-BAC0-4D23-A7B5-3C7BF77F7E5A}" type="datetimeFigureOut">
               <a:rPr lang="en-US" smtClean="0"/>
-              <a:t>1/7/2019</a:t>
+              <a:t>9/17/2019</a:t>
             </a:fld>
             <a:endParaRPr lang="en-US"/>
           </a:p>
@@ -4762,7 +4766,7 @@
           <a:p>
             <a:fld id="{995B0E5A-BAC0-4D23-A7B5-3C7BF77F7E5A}" type="datetimeFigureOut">
               <a:rPr lang="en-US" smtClean="0"/>
-              <a:t>1/7/2019</a:t>
+              <a:t>9/17/2019</a:t>
             </a:fld>
             <a:endParaRPr lang="en-US"/>
           </a:p>
@@ -5136,7 +5140,7 @@
           <a:p>
             <a:fld id="{995B0E5A-BAC0-4D23-A7B5-3C7BF77F7E5A}" type="datetimeFigureOut">
               <a:rPr lang="en-US" smtClean="0"/>
-              <a:t>1/7/2019</a:t>
+              <a:t>9/17/2019</a:t>
             </a:fld>
             <a:endParaRPr lang="en-US"/>
           </a:p>
@@ -5259,7 +5263,7 @@
           <a:p>
             <a:fld id="{995B0E5A-BAC0-4D23-A7B5-3C7BF77F7E5A}" type="datetimeFigureOut">
               <a:rPr lang="en-US" smtClean="0"/>
-              <a:t>1/7/2019</a:t>
+              <a:t>9/17/2019</a:t>
             </a:fld>
             <a:endParaRPr lang="en-US"/>
           </a:p>
@@ -5354,7 +5358,7 @@
           <a:p>
             <a:fld id="{995B0E5A-BAC0-4D23-A7B5-3C7BF77F7E5A}" type="datetimeFigureOut">
               <a:rPr lang="en-US" smtClean="0"/>
-              <a:t>1/7/2019</a:t>
+              <a:t>9/17/2019</a:t>
             </a:fld>
             <a:endParaRPr lang="en-US"/>
           </a:p>
@@ -5609,7 +5613,7 @@
           <a:p>
             <a:fld id="{995B0E5A-BAC0-4D23-A7B5-3C7BF77F7E5A}" type="datetimeFigureOut">
               <a:rPr lang="en-US" smtClean="0"/>
-              <a:t>1/7/2019</a:t>
+              <a:t>9/17/2019</a:t>
             </a:fld>
             <a:endParaRPr lang="en-US"/>
           </a:p>
@@ -5872,7 +5876,7 @@
           <a:p>
             <a:fld id="{995B0E5A-BAC0-4D23-A7B5-3C7BF77F7E5A}" type="datetimeFigureOut">
               <a:rPr lang="en-US" smtClean="0"/>
-              <a:t>1/7/2019</a:t>
+              <a:t>9/17/2019</a:t>
             </a:fld>
             <a:endParaRPr lang="en-US"/>
           </a:p>
@@ -6615,7 +6619,7 @@
           <a:p>
             <a:fld id="{995B0E5A-BAC0-4D23-A7B5-3C7BF77F7E5A}" type="datetimeFigureOut">
               <a:rPr lang="en-US" smtClean="0"/>
-              <a:t>1/7/2019</a:t>
+              <a:t>9/17/2019</a:t>
             </a:fld>
             <a:endParaRPr lang="en-US"/>
           </a:p>
@@ -7183,15 +7187,50 @@
             <p:ph type="subTitle" idx="1"/>
           </p:nvPr>
         </p:nvSpPr>
-        <p:spPr/>
-        <p:txBody>
-          <a:bodyPr/>
+        <p:spPr>
+          <a:xfrm>
+            <a:off x="1507067" y="4050833"/>
+            <a:ext cx="7766936" cy="1784702"/>
+          </a:xfrm>
+        </p:spPr>
+        <p:txBody>
+          <a:bodyPr>
+            <a:normAutofit/>
+          </a:bodyPr>
           <a:lstStyle/>
           <a:p>
             <a:r>
               <a:rPr lang="en-US" dirty="0"/>
               <a:t>C. David Littlejohn</a:t>
             </a:r>
+          </a:p>
+          <a:p>
+            <a:r>
+              <a:rPr lang="en-US" dirty="0"/>
+              <a:t>https://github.com/ergo3114</a:t>
+            </a:r>
+          </a:p>
+          <a:p>
+            <a:r>
+              <a:rPr lang="en-US" dirty="0"/>
+              <a:t>@</a:t>
+            </a:r>
+            <a:r>
+              <a:rPr lang="en-US" dirty="0" err="1"/>
+              <a:t>littlejohnpsh</a:t>
+            </a:r>
+            <a:endParaRPr lang="en-US" dirty="0"/>
+          </a:p>
+          <a:p>
+            <a:r>
+              <a:rPr lang="en-US" dirty="0"/>
+              <a:t>@</a:t>
+            </a:r>
+            <a:r>
+              <a:rPr lang="en-US" dirty="0" err="1"/>
+              <a:t>pshchatt</a:t>
+            </a:r>
+            <a:endParaRPr lang="en-US" dirty="0"/>
           </a:p>
         </p:txBody>
       </p:sp>
@@ -7230,7 +7269,7 @@
           <p:cNvPr id="2" name="Title 1">
             <a:extLst>
               <a:ext uri="{FF2B5EF4-FFF2-40B4-BE49-F238E27FC236}">
-                <a16:creationId xmlns:a16="http://schemas.microsoft.com/office/drawing/2014/main" id="{84CB461D-9B34-472F-B43C-8215BD94B96A}"/>
+                <a16:creationId xmlns:a16="http://schemas.microsoft.com/office/drawing/2014/main" id="{52A2985E-6762-4F9E-853B-42250F9A5A01}"/>
               </a:ext>
             </a:extLst>
           </p:cNvPr>
@@ -7248,7 +7287,7 @@
           <a:p>
             <a:r>
               <a:rPr lang="en-US" dirty="0"/>
-              <a:t>References</a:t>
+              <a:t>Questions?</a:t>
             </a:r>
           </a:p>
         </p:txBody>
@@ -7258,7 +7297,7 @@
           <p:cNvPr id="3" name="Content Placeholder 2">
             <a:extLst>
               <a:ext uri="{FF2B5EF4-FFF2-40B4-BE49-F238E27FC236}">
-                <a16:creationId xmlns:a16="http://schemas.microsoft.com/office/drawing/2014/main" id="{E5C579EC-9E8D-4FA6-8F82-64DA91B3E040}"/>
+                <a16:creationId xmlns:a16="http://schemas.microsoft.com/office/drawing/2014/main" id="{AFE697F1-5833-4769-B246-D55464FD3966}"/>
               </a:ext>
             </a:extLst>
           </p:cNvPr>
@@ -7275,70 +7314,16 @@
           <a:lstStyle/>
           <a:p>
             <a:r>
-              <a:rPr lang="en-US" b="1" dirty="0"/>
-              <a:t>Understanding the Try/Catch Block in PowerShell by Adam Bertram </a:t>
-            </a:r>
-            <a:r>
-              <a:rPr lang="en-US" dirty="0">
-                <a:hlinkClick r:id="rId2"/>
-              </a:rPr>
-              <a:t>https://mcpmag.com/articles/2016/08/18/try-catch-block-in-powershell.aspx</a:t>
-            </a:r>
-            <a:endParaRPr lang="en-US" dirty="0"/>
-          </a:p>
-          <a:p>
-            <a:r>
-              <a:rPr lang="en-US" b="1" dirty="0"/>
-              <a:t>PowerShell: Everything you wanted to know about exceptions by Kevin Marquette </a:t>
-            </a:r>
-            <a:r>
-              <a:rPr lang="en-US" dirty="0">
-                <a:hlinkClick r:id="rId3"/>
-              </a:rPr>
-              <a:t>https://kevinmarquette.github.io/2017-04-10-Powershell-exceptions-everything-you-ever-wanted-to-know/</a:t>
-            </a:r>
-            <a:endParaRPr lang="en-US" dirty="0"/>
-          </a:p>
-          <a:p>
-            <a:r>
-              <a:rPr lang="en-US" b="1" dirty="0" err="1"/>
-              <a:t>About_Throw</a:t>
-            </a:r>
-            <a:r>
               <a:rPr lang="en-US" dirty="0"/>
-              <a:t> </a:t>
-            </a:r>
-            <a:r>
-              <a:rPr lang="en-US" dirty="0">
-                <a:hlinkClick r:id="rId4"/>
-              </a:rPr>
-              <a:t>https://docs.microsoft.com/en-us/powershell/module/microsoft.powershell.core/about/about_throw?view=powershell-6</a:t>
-            </a:r>
-            <a:endParaRPr lang="en-US" dirty="0"/>
-          </a:p>
-          <a:p>
-            <a:r>
-              <a:rPr lang="en-US" b="1" dirty="0"/>
-              <a:t>Error Handing by Margaret Rouse</a:t>
-            </a:r>
-            <a:r>
-              <a:rPr lang="en-US" dirty="0"/>
-              <a:t> </a:t>
-            </a:r>
-            <a:r>
-              <a:rPr lang="en-US" dirty="0">
-                <a:hlinkClick r:id="rId5"/>
-              </a:rPr>
-              <a:t>https://searchsoftwarequality.techtarget.com/definition/error-handling</a:t>
-            </a:r>
-            <a:endParaRPr lang="en-US" dirty="0"/>
+              <a:t>If you think of something after this session, catch me in the hall!</a:t>
+            </a:r>
           </a:p>
         </p:txBody>
       </p:sp>
     </p:spTree>
     <p:extLst>
       <p:ext uri="{BB962C8B-B14F-4D97-AF65-F5344CB8AC3E}">
-        <p14:creationId xmlns:p14="http://schemas.microsoft.com/office/powerpoint/2010/main" val="3379474450"/>
+        <p14:creationId xmlns:p14="http://schemas.microsoft.com/office/powerpoint/2010/main" val="42694539"/>
       </p:ext>
     </p:extLst>
   </p:cSld>
@@ -9380,7 +9365,7 @@
           <p:cNvPr id="2" name="Title 1">
             <a:extLst>
               <a:ext uri="{FF2B5EF4-FFF2-40B4-BE49-F238E27FC236}">
-                <a16:creationId xmlns:a16="http://schemas.microsoft.com/office/drawing/2014/main" id="{6AA5720B-B6B4-43A3-8113-7BDB2B81667A}"/>
+                <a16:creationId xmlns:a16="http://schemas.microsoft.com/office/drawing/2014/main" id="{84CB461D-9B34-472F-B43C-8215BD94B96A}"/>
               </a:ext>
             </a:extLst>
           </p:cNvPr>
@@ -9388,7 +9373,7 @@
             <a:spLocks noGrp="1"/>
           </p:cNvSpPr>
           <p:nvPr>
-            <p:ph type="ctrTitle"/>
+            <p:ph type="title"/>
           </p:nvPr>
         </p:nvSpPr>
         <p:spPr/>
@@ -9398,17 +9383,17 @@
           <a:p>
             <a:r>
               <a:rPr lang="en-US" dirty="0"/>
-              <a:t>C. David Littlejohn</a:t>
-            </a:r>
-          </a:p>
-        </p:txBody>
-      </p:sp>
-      <p:sp>
-        <p:nvSpPr>
-          <p:cNvPr id="3" name="Subtitle 2">
+              <a:t>References</a:t>
+            </a:r>
+          </a:p>
+        </p:txBody>
+      </p:sp>
+      <p:sp>
+        <p:nvSpPr>
+          <p:cNvPr id="3" name="Content Placeholder 2">
             <a:extLst>
               <a:ext uri="{FF2B5EF4-FFF2-40B4-BE49-F238E27FC236}">
-                <a16:creationId xmlns:a16="http://schemas.microsoft.com/office/drawing/2014/main" id="{C2855E51-53FD-47C7-9192-EDD0CEE41134}"/>
+                <a16:creationId xmlns:a16="http://schemas.microsoft.com/office/drawing/2014/main" id="{E5C579EC-9E8D-4FA6-8F82-64DA91B3E040}"/>
               </a:ext>
             </a:extLst>
           </p:cNvPr>
@@ -9416,44 +9401,94 @@
             <a:spLocks noGrp="1"/>
           </p:cNvSpPr>
           <p:nvPr>
-            <p:ph type="subTitle" idx="1"/>
+            <p:ph idx="1"/>
           </p:nvPr>
         </p:nvSpPr>
         <p:spPr/>
         <p:txBody>
           <a:bodyPr>
-            <a:normAutofit lnSpcReduction="10000"/>
+            <a:normAutofit fontScale="92500" lnSpcReduction="10000"/>
           </a:bodyPr>
           <a:lstStyle/>
           <a:p>
             <a:r>
+              <a:rPr lang="en-US" b="1" dirty="0"/>
+              <a:t>Understanding the Try/Catch Block in PowerShell by Adam Bertram </a:t>
+            </a:r>
+            <a:r>
+              <a:rPr lang="en-US" dirty="0">
+                <a:hlinkClick r:id="rId2"/>
+              </a:rPr>
+              <a:t>https://mcpmag.com/articles/2016/08/18/try-catch-block-in-powershell.aspx</a:t>
+            </a:r>
+            <a:endParaRPr lang="en-US" dirty="0"/>
+          </a:p>
+          <a:p>
+            <a:r>
+              <a:rPr lang="en-US" b="1" dirty="0"/>
+              <a:t>PowerShell: Everything you wanted to know about exceptions by Kevin Marquette </a:t>
+            </a:r>
+            <a:r>
+              <a:rPr lang="en-US" dirty="0">
+                <a:hlinkClick r:id="rId3"/>
+              </a:rPr>
+              <a:t>https://kevinmarquette.github.io/2017-04-10-Powershell-exceptions-everything-you-ever-wanted-to-know/</a:t>
+            </a:r>
+            <a:endParaRPr lang="en-US" dirty="0"/>
+          </a:p>
+          <a:p>
+            <a:r>
+              <a:rPr lang="en-US" b="1" dirty="0" err="1"/>
+              <a:t>About_Throw</a:t>
+            </a:r>
+            <a:r>
+              <a:rPr lang="en-US" b="1" dirty="0"/>
+              <a:t>	</a:t>
+            </a:r>
+            <a:r>
+              <a:rPr lang="en-US" dirty="0">
+                <a:hlinkClick r:id="rId4"/>
+              </a:rPr>
+              <a:t>https://docs.microsoft.com/en-us/powershell/module/microsoft.powershell.core/about/about_throw?view=powershell-6</a:t>
+            </a:r>
+            <a:endParaRPr lang="en-US" dirty="0"/>
+          </a:p>
+          <a:p>
+            <a:r>
+              <a:rPr lang="en-US" b="1" dirty="0"/>
+              <a:t>Error Handing by Margaret Rouse</a:t>
+            </a:r>
+            <a:r>
               <a:rPr lang="en-US" dirty="0"/>
-              <a:t>Twitter: @</a:t>
-            </a:r>
-            <a:r>
-              <a:rPr lang="en-US" dirty="0" err="1"/>
-              <a:t>LittlejohnPSH</a:t>
+              <a:t> </a:t>
+            </a:r>
+            <a:r>
+              <a:rPr lang="en-US" dirty="0">
+                <a:hlinkClick r:id="rId5"/>
+              </a:rPr>
+              <a:t>https://searchsoftwarequality.techtarget.com/definition/error-handling</a:t>
             </a:r>
             <a:endParaRPr lang="en-US" dirty="0"/>
           </a:p>
           <a:p>
             <a:r>
-              <a:rPr lang="en-US" dirty="0"/>
-              <a:t>GitHub: https://github.com/ergo3114/</a:t>
-            </a:r>
-          </a:p>
-          <a:p>
-            <a:r>
-              <a:rPr lang="en-US" dirty="0"/>
-              <a:t>WordPress: https://bit.ly/2KF1ECM</a:t>
-            </a:r>
+              <a:rPr lang="en-US" b="1" dirty="0"/>
+              <a:t>An Introduction to Error Handling in PowerShell </a:t>
+            </a:r>
+            <a:r>
+              <a:rPr lang="en-US" dirty="0">
+                <a:hlinkClick r:id="rId6"/>
+              </a:rPr>
+              <a:t>https://blogs.msdn.microsoft.com/kebab/2013/06/09/an-introduction-to-error-handling-in-powershell/</a:t>
+            </a:r>
+            <a:endParaRPr lang="en-US" dirty="0"/>
           </a:p>
         </p:txBody>
       </p:sp>
     </p:spTree>
     <p:extLst>
       <p:ext uri="{BB962C8B-B14F-4D97-AF65-F5344CB8AC3E}">
-        <p14:creationId xmlns:p14="http://schemas.microsoft.com/office/powerpoint/2010/main" val="3307867842"/>
+        <p14:creationId xmlns:p14="http://schemas.microsoft.com/office/powerpoint/2010/main" val="3379474450"/>
       </p:ext>
     </p:extLst>
   </p:cSld>

</xml_diff>

<commit_message>
Update to throwing errors
</commit_message>
<xml_diff>
--- a/ErrorHandling.pptx
+++ b/ErrorHandling.pptx
@@ -609,7 +609,7 @@
             </a:pPr>
             <a:r>
               <a:rPr lang="en-US" dirty="0"/>
-              <a:t>Environments change all the time and may have adverse affects on your scripts</a:t>
+              <a:t>(Example of CALWEB) Environments change all the time and may have adverse affects on your scripts</a:t>
             </a:r>
           </a:p>
           <a:p>
@@ -1027,6 +1027,12 @@
               <a:t>Show example 3</a:t>
             </a:r>
           </a:p>
+          <a:p>
+            <a:r>
+              <a:rPr lang="en-US" dirty="0"/>
+              <a:t>Show example 4</a:t>
+            </a:r>
+          </a:p>
         </p:txBody>
       </p:sp>
       <p:sp>
@@ -1129,7 +1135,7 @@
           <a:p>
             <a:r>
               <a:rPr lang="en-US" dirty="0"/>
-              <a:t>Show example 4</a:t>
+              <a:t>Show example 5</a:t>
             </a:r>
           </a:p>
         </p:txBody>
@@ -1250,7 +1256,7 @@
           <a:p>
             <a:r>
               <a:rPr lang="en-US" dirty="0"/>
-              <a:t>Show example 5</a:t>
+              <a:t>Show example 6</a:t>
             </a:r>
           </a:p>
         </p:txBody>
@@ -1385,7 +1391,15 @@
           <a:p>
             <a:r>
               <a:rPr lang="en-US" dirty="0"/>
-              <a:t>Show example 6 then 7</a:t>
+              <a:t>Show example 7 </a:t>
+            </a:r>
+            <a:r>
+              <a:rPr lang="en-US"/>
+              <a:t>then </a:t>
+            </a:r>
+            <a:r>
+              <a:rPr lang="en-US" dirty="0"/>
+              <a:t>8</a:t>
             </a:r>
           </a:p>
         </p:txBody>

</xml_diff>